<commit_message>
updates on the benchmark
</commit_message>
<xml_diff>
--- a/doc/20210316_CR.pptx
+++ b/doc/20210316_CR.pptx
@@ -16613,7 +16613,7 @@
           <a:p>
             <a:fld id="{46D2FF82-6B29-44D2-BD3C-588726427E6D}" type="datetimeFigureOut">
               <a:rPr lang="zh-CN" altLang="en-US" smtClean="0"/>
-              <a:t>2021/3/17</a:t>
+              <a:t>2021/3/22</a:t>
             </a:fld>
             <a:endParaRPr lang="zh-CN" altLang="en-US"/>
           </a:p>
@@ -17114,7 +17114,7 @@
           <a:p>
             <a:fld id="{5041867B-4B1C-4C01-BCD1-839AFBF713B2}" type="datetimeFigureOut">
               <a:rPr lang="zh-CN" altLang="en-US" smtClean="0"/>
-              <a:t>2021/3/17</a:t>
+              <a:t>2021/3/22</a:t>
             </a:fld>
             <a:endParaRPr lang="zh-CN" altLang="en-US"/>
           </a:p>
@@ -17314,7 +17314,7 @@
           <a:p>
             <a:fld id="{5041867B-4B1C-4C01-BCD1-839AFBF713B2}" type="datetimeFigureOut">
               <a:rPr lang="zh-CN" altLang="en-US" smtClean="0"/>
-              <a:t>2021/3/17</a:t>
+              <a:t>2021/3/22</a:t>
             </a:fld>
             <a:endParaRPr lang="zh-CN" altLang="en-US"/>
           </a:p>
@@ -17524,7 +17524,7 @@
           <a:p>
             <a:fld id="{5041867B-4B1C-4C01-BCD1-839AFBF713B2}" type="datetimeFigureOut">
               <a:rPr lang="zh-CN" altLang="en-US" smtClean="0"/>
-              <a:t>2021/3/17</a:t>
+              <a:t>2021/3/22</a:t>
             </a:fld>
             <a:endParaRPr lang="zh-CN" altLang="en-US"/>
           </a:p>
@@ -17724,7 +17724,7 @@
           <a:p>
             <a:fld id="{5041867B-4B1C-4C01-BCD1-839AFBF713B2}" type="datetimeFigureOut">
               <a:rPr lang="zh-CN" altLang="en-US" smtClean="0"/>
-              <a:t>2021/3/17</a:t>
+              <a:t>2021/3/22</a:t>
             </a:fld>
             <a:endParaRPr lang="zh-CN" altLang="en-US"/>
           </a:p>
@@ -18000,7 +18000,7 @@
           <a:p>
             <a:fld id="{5041867B-4B1C-4C01-BCD1-839AFBF713B2}" type="datetimeFigureOut">
               <a:rPr lang="zh-CN" altLang="en-US" smtClean="0"/>
-              <a:t>2021/3/17</a:t>
+              <a:t>2021/3/22</a:t>
             </a:fld>
             <a:endParaRPr lang="zh-CN" altLang="en-US"/>
           </a:p>
@@ -18268,7 +18268,7 @@
           <a:p>
             <a:fld id="{5041867B-4B1C-4C01-BCD1-839AFBF713B2}" type="datetimeFigureOut">
               <a:rPr lang="zh-CN" altLang="en-US" smtClean="0"/>
-              <a:t>2021/3/17</a:t>
+              <a:t>2021/3/22</a:t>
             </a:fld>
             <a:endParaRPr lang="zh-CN" altLang="en-US"/>
           </a:p>
@@ -18683,7 +18683,7 @@
           <a:p>
             <a:fld id="{5041867B-4B1C-4C01-BCD1-839AFBF713B2}" type="datetimeFigureOut">
               <a:rPr lang="zh-CN" altLang="en-US" smtClean="0"/>
-              <a:t>2021/3/17</a:t>
+              <a:t>2021/3/22</a:t>
             </a:fld>
             <a:endParaRPr lang="zh-CN" altLang="en-US"/>
           </a:p>
@@ -18825,7 +18825,7 @@
           <a:p>
             <a:fld id="{5041867B-4B1C-4C01-BCD1-839AFBF713B2}" type="datetimeFigureOut">
               <a:rPr lang="zh-CN" altLang="en-US" smtClean="0"/>
-              <a:t>2021/3/17</a:t>
+              <a:t>2021/3/22</a:t>
             </a:fld>
             <a:endParaRPr lang="zh-CN" altLang="en-US"/>
           </a:p>
@@ -18938,7 +18938,7 @@
           <a:p>
             <a:fld id="{5041867B-4B1C-4C01-BCD1-839AFBF713B2}" type="datetimeFigureOut">
               <a:rPr lang="zh-CN" altLang="en-US" smtClean="0"/>
-              <a:t>2021/3/17</a:t>
+              <a:t>2021/3/22</a:t>
             </a:fld>
             <a:endParaRPr lang="zh-CN" altLang="en-US"/>
           </a:p>
@@ -19251,7 +19251,7 @@
           <a:p>
             <a:fld id="{5041867B-4B1C-4C01-BCD1-839AFBF713B2}" type="datetimeFigureOut">
               <a:rPr lang="zh-CN" altLang="en-US" smtClean="0"/>
-              <a:t>2021/3/17</a:t>
+              <a:t>2021/3/22</a:t>
             </a:fld>
             <a:endParaRPr lang="zh-CN" altLang="en-US"/>
           </a:p>
@@ -19540,7 +19540,7 @@
           <a:p>
             <a:fld id="{5041867B-4B1C-4C01-BCD1-839AFBF713B2}" type="datetimeFigureOut">
               <a:rPr lang="zh-CN" altLang="en-US" smtClean="0"/>
-              <a:t>2021/3/17</a:t>
+              <a:t>2021/3/22</a:t>
             </a:fld>
             <a:endParaRPr lang="zh-CN" altLang="en-US"/>
           </a:p>
@@ -19783,7 +19783,7 @@
           <a:p>
             <a:fld id="{5041867B-4B1C-4C01-BCD1-839AFBF713B2}" type="datetimeFigureOut">
               <a:rPr lang="zh-CN" altLang="en-US" smtClean="0"/>
-              <a:t>2021/3/17</a:t>
+              <a:t>2021/3/22</a:t>
             </a:fld>
             <a:endParaRPr lang="zh-CN" altLang="en-US"/>
           </a:p>
@@ -20629,7 +20629,7 @@
         </p:spPr>
         <p:txBody>
           <a:bodyPr>
-            <a:normAutofit fontScale="77500" lnSpcReduction="20000"/>
+            <a:normAutofit fontScale="62500" lnSpcReduction="20000"/>
           </a:bodyPr>
           <a:lstStyle/>
           <a:p>
@@ -20736,6 +20736,20 @@
               <a:rPr lang="en-US" altLang="zh-CN" dirty="0"/>
               <a:t>Anything else?</a:t>
             </a:r>
+          </a:p>
+          <a:p>
+            <a:endParaRPr lang="en-US" altLang="zh-CN" dirty="0"/>
+          </a:p>
+          <a:p>
+            <a:r>
+              <a:rPr lang="en-US" altLang="zh-CN" dirty="0"/>
+              <a:t>Project </a:t>
+            </a:r>
+            <a:r>
+              <a:rPr lang="en-US" altLang="zh-CN"/>
+              <a:t>directed presentation</a:t>
+            </a:r>
+            <a:endParaRPr lang="en-US" altLang="zh-CN" dirty="0"/>
           </a:p>
         </p:txBody>
       </p:sp>

</xml_diff>